<commit_message>
mapas en PP CN_07_11 y 12
</commit_message>
<xml_diff>
--- a/fuentes/contenidos/grado10/guion02/CN_10_02_F.pptx
+++ b/fuentes/contenidos/grado10/guion02/CN_10_02_F.pptx
@@ -106,13 +106,18 @@
   </p:defaultTextStyle>
   <p:extLst>
     <p:ext uri="{EFAFB233-063F-42B5-8137-9DF3F51BA10A}">
-      <p15:sldGuideLst xmlns:p15="http://schemas.microsoft.com/office/powerpoint/2012/main" xmlns="">
+      <p15:sldGuideLst xmlns:p15="http://schemas.microsoft.com/office/powerpoint/2012/main">
         <p15:guide id="1" orient="horz" pos="2160">
           <p15:clr>
             <a:srgbClr val="A4A3A4"/>
           </p15:clr>
         </p15:guide>
         <p15:guide id="2" pos="2880">
+          <p15:clr>
+            <a:srgbClr val="A4A3A4"/>
+          </p15:clr>
+        </p15:guide>
+        <p15:guide id="3" pos="2866">
           <p15:clr>
             <a:srgbClr val="A4A3A4"/>
           </p15:clr>
@@ -153,7 +158,7 @@
   <p:timing>
     <p:tnLst>
       <p:par>
-        <p:cTn xmlns:p14="http://schemas.microsoft.com/office/powerpoint/2010/main" id="1" dur="indefinite" restart="never" nodeType="tmRoot"/>
+        <p:cTn id="1" dur="indefinite" restart="never" nodeType="tmRoot"/>
       </p:par>
     </p:tnLst>
   </p:timing>
@@ -190,7 +195,7 @@
   <p:timing>
     <p:tnLst>
       <p:par>
-        <p:cTn xmlns:p14="http://schemas.microsoft.com/office/powerpoint/2010/main" id="1" dur="indefinite" restart="never" nodeType="tmRoot"/>
+        <p:cTn id="1" dur="indefinite" restart="never" nodeType="tmRoot"/>
       </p:par>
     </p:tnLst>
   </p:timing>
@@ -227,7 +232,7 @@
   <p:timing>
     <p:tnLst>
       <p:par>
-        <p:cTn xmlns:p14="http://schemas.microsoft.com/office/powerpoint/2010/main" id="1" dur="indefinite" restart="never" nodeType="tmRoot"/>
+        <p:cTn id="1" dur="indefinite" restart="never" nodeType="tmRoot"/>
       </p:par>
     </p:tnLst>
   </p:timing>
@@ -264,7 +269,7 @@
   <p:timing>
     <p:tnLst>
       <p:par>
-        <p:cTn xmlns:p14="http://schemas.microsoft.com/office/powerpoint/2010/main" id="1" dur="indefinite" restart="never" nodeType="tmRoot"/>
+        <p:cTn id="1" dur="indefinite" restart="never" nodeType="tmRoot"/>
       </p:par>
     </p:tnLst>
   </p:timing>
@@ -301,7 +306,7 @@
   <p:timing>
     <p:tnLst>
       <p:par>
-        <p:cTn xmlns:p14="http://schemas.microsoft.com/office/powerpoint/2010/main" id="1" dur="indefinite" restart="never" nodeType="tmRoot"/>
+        <p:cTn id="1" dur="indefinite" restart="never" nodeType="tmRoot"/>
       </p:par>
     </p:tnLst>
   </p:timing>
@@ -338,7 +343,7 @@
   <p:timing>
     <p:tnLst>
       <p:par>
-        <p:cTn xmlns:p14="http://schemas.microsoft.com/office/powerpoint/2010/main" id="1" dur="indefinite" restart="never" nodeType="tmRoot"/>
+        <p:cTn id="1" dur="indefinite" restart="never" nodeType="tmRoot"/>
       </p:par>
     </p:tnLst>
   </p:timing>
@@ -375,7 +380,7 @@
   <p:timing>
     <p:tnLst>
       <p:par>
-        <p:cTn xmlns:p14="http://schemas.microsoft.com/office/powerpoint/2010/main" id="1" dur="indefinite" restart="never" nodeType="tmRoot"/>
+        <p:cTn id="1" dur="indefinite" restart="never" nodeType="tmRoot"/>
       </p:par>
     </p:tnLst>
   </p:timing>
@@ -412,7 +417,7 @@
   <p:timing>
     <p:tnLst>
       <p:par>
-        <p:cTn xmlns:p14="http://schemas.microsoft.com/office/powerpoint/2010/main" id="1" dur="indefinite" restart="never" nodeType="tmRoot"/>
+        <p:cTn id="1" dur="indefinite" restart="never" nodeType="tmRoot"/>
       </p:par>
     </p:tnLst>
   </p:timing>
@@ -461,7 +466,7 @@
           <a:p>
             <a:fld id="{5001C876-01F7-4317-94B9-1AE222133113}" type="datetimeFigureOut">
               <a:rPr lang="es-ES" smtClean="0"/>
-              <a:t>21/09/15</a:t>
+              <a:t>21/10/2015</a:t>
             </a:fld>
             <a:endParaRPr lang="es-ES"/>
           </a:p>
@@ -519,7 +524,7 @@
           <a:p>
             <a:fld id="{58140F73-F5A2-4B82-A2FA-BF1850CF1309}" type="slidenum">
               <a:rPr lang="es-ES" smtClean="0"/>
-              <a:t>‹Nr.›</a:t>
+              <a:t>‹Nº›</a:t>
             </a:fld>
             <a:endParaRPr lang="es-ES"/>
           </a:p>
@@ -538,7 +543,7 @@
   <p:timing>
     <p:tnLst>
       <p:par>
-        <p:cTn xmlns:p14="http://schemas.microsoft.com/office/powerpoint/2010/main" id="1" dur="indefinite" restart="never" nodeType="tmRoot"/>
+        <p:cTn id="1" dur="indefinite" restart="never" nodeType="tmRoot"/>
       </p:par>
     </p:tnLst>
   </p:timing>
@@ -575,7 +580,7 @@
   <p:timing>
     <p:tnLst>
       <p:par>
-        <p:cTn xmlns:p14="http://schemas.microsoft.com/office/powerpoint/2010/main" id="1" dur="indefinite" restart="never" nodeType="tmRoot"/>
+        <p:cTn id="1" dur="indefinite" restart="never" nodeType="tmRoot"/>
       </p:par>
     </p:tnLst>
   </p:timing>
@@ -612,7 +617,7 @@
   <p:timing>
     <p:tnLst>
       <p:par>
-        <p:cTn xmlns:p14="http://schemas.microsoft.com/office/powerpoint/2010/main" id="1" dur="indefinite" restart="never" nodeType="tmRoot"/>
+        <p:cTn id="1" dur="indefinite" restart="never" nodeType="tmRoot"/>
       </p:par>
     </p:tnLst>
   </p:timing>
@@ -725,7 +730,7 @@
   <p:timing>
     <p:tnLst>
       <p:par>
-        <p:cTn xmlns:p14="http://schemas.microsoft.com/office/powerpoint/2010/main" id="1" dur="indefinite" restart="never" nodeType="tmRoot"/>
+        <p:cTn id="1" dur="indefinite" restart="never" nodeType="tmRoot"/>
       </p:par>
     </p:tnLst>
   </p:timing>
@@ -1240,7 +1245,7 @@
                   <a:schemeClr val="bg1"/>
                 </a:solidFill>
               </a:rPr>
-              <a:t>Trayectorias</a:t>
+              <a:t>trayectorias</a:t>
             </a:r>
             <a:endParaRPr lang="es-ES" sz="1000" dirty="0">
               <a:solidFill>
@@ -1283,12 +1288,20 @@
           <a:p>
             <a:pPr algn="ctr"/>
             <a:r>
+              <a:rPr lang="es-ES" sz="1000" dirty="0">
+                <a:solidFill>
+                  <a:schemeClr val="bg1"/>
+                </a:solidFill>
+              </a:rPr>
+              <a:t>e</a:t>
+            </a:r>
+            <a:r>
               <a:rPr lang="es-ES" sz="1000" dirty="0" smtClean="0">
                 <a:solidFill>
                   <a:schemeClr val="bg1"/>
                 </a:solidFill>
               </a:rPr>
-              <a:t>Escalares</a:t>
+              <a:t>scalares</a:t>
             </a:r>
             <a:endParaRPr lang="es-ES" sz="1000" dirty="0">
               <a:solidFill>
@@ -1331,12 +1344,20 @@
           <a:p>
             <a:pPr algn="ctr"/>
             <a:r>
+              <a:rPr lang="es-ES" sz="1000" dirty="0">
+                <a:solidFill>
+                  <a:schemeClr val="bg1"/>
+                </a:solidFill>
+              </a:rPr>
+              <a:t>v</a:t>
+            </a:r>
+            <a:r>
               <a:rPr lang="es-ES" sz="1000" dirty="0" smtClean="0">
                 <a:solidFill>
                   <a:schemeClr val="bg1"/>
                 </a:solidFill>
               </a:rPr>
-              <a:t>Vectoriales</a:t>
+              <a:t>ectoriales</a:t>
             </a:r>
             <a:endParaRPr lang="es-ES" sz="1000" dirty="0">
               <a:solidFill>
@@ -1475,8 +1496,16 @@
           <a:p>
             <a:pPr algn="ctr"/>
             <a:r>
-              <a:rPr lang="es-ES" sz="900" dirty="0" smtClean="0"/>
-              <a:t>Línea recta</a:t>
+              <a:rPr lang="es-ES" sz="900" dirty="0"/>
+              <a:t>l</a:t>
+            </a:r>
+            <a:r>
+              <a:rPr lang="es-ES" sz="900" dirty="0" smtClean="0"/>
+              <a:t>ínea </a:t>
+            </a:r>
+            <a:r>
+              <a:rPr lang="es-ES" sz="900" dirty="0" smtClean="0"/>
+              <a:t>recta</a:t>
             </a:r>
           </a:p>
           <a:p>
@@ -1530,7 +1559,7 @@
             <a:pPr algn="ctr"/>
             <a:r>
               <a:rPr lang="es-ES" sz="900" dirty="0" smtClean="0"/>
-              <a:t>Distancia</a:t>
+              <a:t>distancia</a:t>
             </a:r>
             <a:endParaRPr lang="es-ES" sz="900" dirty="0"/>
           </a:p>
@@ -1569,8 +1598,12 @@
           <a:p>
             <a:pPr algn="ctr"/>
             <a:r>
-              <a:rPr lang="es-ES" sz="900" dirty="0" smtClean="0"/>
-              <a:t>Rapidez</a:t>
+              <a:rPr lang="es-ES" sz="900" dirty="0"/>
+              <a:t>r</a:t>
+            </a:r>
+            <a:r>
+              <a:rPr lang="es-ES" sz="900" dirty="0" smtClean="0"/>
+              <a:t>apidez</a:t>
             </a:r>
             <a:endParaRPr lang="es-ES" sz="900" dirty="0"/>
           </a:p>
@@ -1609,8 +1642,12 @@
           <a:p>
             <a:pPr algn="ctr"/>
             <a:r>
-              <a:rPr lang="es-ES" sz="900" dirty="0" smtClean="0"/>
-              <a:t>Desplazamiento</a:t>
+              <a:rPr lang="es-ES" sz="900" dirty="0"/>
+              <a:t>d</a:t>
+            </a:r>
+            <a:r>
+              <a:rPr lang="es-ES" sz="900" dirty="0" smtClean="0"/>
+              <a:t>esplazamiento</a:t>
             </a:r>
             <a:endParaRPr lang="es-ES" sz="900" dirty="0"/>
           </a:p>
@@ -1649,8 +1686,12 @@
           <a:p>
             <a:pPr algn="ctr"/>
             <a:r>
-              <a:rPr lang="es-ES" sz="900" dirty="0" smtClean="0"/>
-              <a:t>Velocidad</a:t>
+              <a:rPr lang="es-ES" sz="900" dirty="0"/>
+              <a:t>v</a:t>
+            </a:r>
+            <a:r>
+              <a:rPr lang="es-ES" sz="900" dirty="0" smtClean="0"/>
+              <a:t>elocidad</a:t>
             </a:r>
             <a:endParaRPr lang="es-ES" sz="900" dirty="0"/>
           </a:p>
@@ -1689,8 +1730,12 @@
           <a:p>
             <a:pPr algn="ctr"/>
             <a:r>
-              <a:rPr lang="es-ES" sz="900" dirty="0" smtClean="0"/>
-              <a:t>Aceleración</a:t>
+              <a:rPr lang="es-ES" sz="900" dirty="0"/>
+              <a:t>a</a:t>
+            </a:r>
+            <a:r>
+              <a:rPr lang="es-ES" sz="900" dirty="0" smtClean="0"/>
+              <a:t>celeración</a:t>
             </a:r>
             <a:endParaRPr lang="es-ES" sz="900" dirty="0"/>
           </a:p>
@@ -1729,8 +1774,12 @@
           <a:p>
             <a:pPr algn="ctr"/>
             <a:r>
-              <a:rPr lang="es-ES" sz="900" dirty="0" smtClean="0"/>
-              <a:t>Trayectoria</a:t>
+              <a:rPr lang="es-ES" sz="900" dirty="0"/>
+              <a:t>t</a:t>
+            </a:r>
+            <a:r>
+              <a:rPr lang="es-ES" sz="900" dirty="0" smtClean="0"/>
+              <a:t>rayectoria</a:t>
             </a:r>
             <a:endParaRPr lang="es-ES" sz="900" dirty="0"/>
           </a:p>
@@ -1889,8 +1938,12 @@
           <a:p>
             <a:pPr algn="ctr"/>
             <a:r>
-              <a:rPr lang="es-ES" sz="900" dirty="0" smtClean="0"/>
-              <a:t>Rectilínea</a:t>
+              <a:rPr lang="es-ES" sz="900" dirty="0"/>
+              <a:t>r</a:t>
+            </a:r>
+            <a:r>
+              <a:rPr lang="es-ES" sz="900" dirty="0" smtClean="0"/>
+              <a:t>ectilínea</a:t>
             </a:r>
             <a:endParaRPr lang="es-ES" sz="900" dirty="0"/>
           </a:p>
@@ -2049,8 +2102,16 @@
           <a:p>
             <a:pPr algn="ctr"/>
             <a:r>
-              <a:rPr lang="es-ES" sz="900" dirty="0" smtClean="0"/>
-              <a:t>Velocidad constante</a:t>
+              <a:rPr lang="es-ES" sz="900" dirty="0"/>
+              <a:t>v</a:t>
+            </a:r>
+            <a:r>
+              <a:rPr lang="es-ES" sz="900" dirty="0" smtClean="0"/>
+              <a:t>elocidad </a:t>
+            </a:r>
+            <a:r>
+              <a:rPr lang="es-ES" sz="900" dirty="0" smtClean="0"/>
+              <a:t>constante</a:t>
             </a:r>
             <a:endParaRPr lang="es-ES" sz="900" dirty="0"/>
           </a:p>
@@ -2065,7 +2126,7 @@
         <p:spPr>
           <a:xfrm>
             <a:off x="4392929" y="4920504"/>
-            <a:ext cx="949123" cy="369332"/>
+            <a:ext cx="949123" cy="230832"/>
           </a:xfrm>
           <a:prstGeom prst="rect">
             <a:avLst/>
@@ -2085,8 +2146,16 @@
           <a:p>
             <a:pPr algn="ctr"/>
             <a:r>
-              <a:rPr lang="es-ES" sz="900" dirty="0" smtClean="0"/>
-              <a:t>Aceleración nula</a:t>
+              <a:rPr lang="es-ES" sz="900" dirty="0"/>
+              <a:t>a</a:t>
+            </a:r>
+            <a:r>
+              <a:rPr lang="es-ES" sz="900" dirty="0" smtClean="0"/>
+              <a:t>celeración </a:t>
+            </a:r>
+            <a:r>
+              <a:rPr lang="es-ES" sz="900" dirty="0" smtClean="0"/>
+              <a:t>nula</a:t>
             </a:r>
             <a:endParaRPr lang="es-ES" sz="900" dirty="0"/>
           </a:p>
@@ -2123,8 +2192,16 @@
           <a:p>
             <a:pPr algn="ctr"/>
             <a:r>
-              <a:rPr lang="es-ES" sz="900" dirty="0" smtClean="0"/>
-              <a:t>Función lineal</a:t>
+              <a:rPr lang="es-ES" sz="900" dirty="0"/>
+              <a:t>f</a:t>
+            </a:r>
+            <a:r>
+              <a:rPr lang="es-ES" sz="900" dirty="0" smtClean="0"/>
+              <a:t>unción </a:t>
+            </a:r>
+            <a:r>
+              <a:rPr lang="es-ES" sz="900" dirty="0" smtClean="0"/>
+              <a:t>lineal</a:t>
             </a:r>
             <a:endParaRPr lang="es-ES" sz="900" dirty="0"/>
           </a:p>
@@ -2159,8 +2236,16 @@
           <a:p>
             <a:pPr algn="ctr"/>
             <a:r>
-              <a:rPr lang="es-ES" sz="900" dirty="0" smtClean="0"/>
-              <a:t>Pendiente representa velocidad</a:t>
+              <a:rPr lang="es-ES" sz="900" dirty="0"/>
+              <a:t>p</a:t>
+            </a:r>
+            <a:r>
+              <a:rPr lang="es-ES" sz="900" dirty="0" smtClean="0"/>
+              <a:t>endiente </a:t>
+            </a:r>
+            <a:r>
+              <a:rPr lang="es-ES" sz="900" dirty="0" smtClean="0"/>
+              <a:t>representa velocidad</a:t>
             </a:r>
             <a:endParaRPr lang="es-ES" sz="900" dirty="0"/>
           </a:p>
@@ -2199,8 +2284,20 @@
           <a:p>
             <a:pPr algn="ctr"/>
             <a:r>
-              <a:rPr lang="es-ES" sz="900" dirty="0" smtClean="0"/>
-              <a:t>Sistema de referencia fijo</a:t>
+              <a:rPr lang="es-ES" sz="900" dirty="0"/>
+              <a:t>u</a:t>
+            </a:r>
+            <a:r>
+              <a:rPr lang="es-ES" sz="900" dirty="0" smtClean="0"/>
+              <a:t>n s</a:t>
+            </a:r>
+            <a:r>
+              <a:rPr lang="es-ES" sz="900" dirty="0" smtClean="0"/>
+              <a:t>istema </a:t>
+            </a:r>
+            <a:r>
+              <a:rPr lang="es-ES" sz="900" dirty="0" smtClean="0"/>
+              <a:t>de referencia fijo</a:t>
             </a:r>
             <a:endParaRPr lang="es-ES" sz="900" dirty="0"/>
           </a:p>
@@ -2235,8 +2332,20 @@
           <a:p>
             <a:pPr algn="ctr"/>
             <a:r>
-              <a:rPr lang="es-ES" sz="900" dirty="0" smtClean="0"/>
-              <a:t>Velocidad – Tiempo</a:t>
+              <a:rPr lang="es-ES" sz="900" dirty="0"/>
+              <a:t>v</a:t>
+            </a:r>
+            <a:r>
+              <a:rPr lang="es-ES" sz="900" dirty="0" smtClean="0"/>
+              <a:t>elocidad </a:t>
+            </a:r>
+            <a:r>
+              <a:rPr lang="es-ES" sz="900" dirty="0" smtClean="0"/>
+              <a:t>– </a:t>
+            </a:r>
+            <a:r>
+              <a:rPr lang="es-ES" sz="900" dirty="0" smtClean="0"/>
+              <a:t>tiempo</a:t>
             </a:r>
             <a:endParaRPr lang="es-ES" sz="900" dirty="0"/>
           </a:p>
@@ -2271,8 +2380,20 @@
           <a:p>
             <a:pPr algn="ctr"/>
             <a:r>
-              <a:rPr lang="es-ES" sz="900" dirty="0" smtClean="0"/>
-              <a:t>Recta Horizontal</a:t>
+              <a:rPr lang="es-ES" sz="900" dirty="0"/>
+              <a:t>r</a:t>
+            </a:r>
+            <a:r>
+              <a:rPr lang="es-ES" sz="900" dirty="0" smtClean="0"/>
+              <a:t>ecta </a:t>
+            </a:r>
+            <a:r>
+              <a:rPr lang="es-ES" sz="900" dirty="0"/>
+              <a:t>h</a:t>
+            </a:r>
+            <a:r>
+              <a:rPr lang="es-ES" sz="900" dirty="0" smtClean="0"/>
+              <a:t>orizontal</a:t>
             </a:r>
             <a:endParaRPr lang="es-ES" sz="900" dirty="0"/>
           </a:p>
@@ -2308,7 +2429,11 @@
             <a:pPr algn="ctr"/>
             <a:r>
               <a:rPr lang="es-ES" sz="900" dirty="0" smtClean="0"/>
-              <a:t>Área representa el desplazamiento</a:t>
+              <a:t>área </a:t>
+            </a:r>
+            <a:r>
+              <a:rPr lang="es-ES" sz="900" dirty="0" smtClean="0"/>
+              <a:t>representa el desplazamiento</a:t>
             </a:r>
             <a:endParaRPr lang="es-ES" sz="900" dirty="0"/>
           </a:p>
@@ -2345,8 +2470,16 @@
           <a:p>
             <a:pPr algn="ctr"/>
             <a:r>
-              <a:rPr lang="es-ES" sz="900" dirty="0" smtClean="0"/>
-              <a:t>Aceleración constante</a:t>
+              <a:rPr lang="es-ES" sz="900" dirty="0"/>
+              <a:t>a</a:t>
+            </a:r>
+            <a:r>
+              <a:rPr lang="es-ES" sz="900" dirty="0" smtClean="0"/>
+              <a:t>celeración </a:t>
+            </a:r>
+            <a:r>
+              <a:rPr lang="es-ES" sz="900" dirty="0" smtClean="0"/>
+              <a:t>constante</a:t>
             </a:r>
             <a:endParaRPr lang="es-ES" sz="900" dirty="0"/>
           </a:p>
@@ -2383,8 +2516,16 @@
           <a:p>
             <a:pPr algn="ctr"/>
             <a:r>
-              <a:rPr lang="es-ES" sz="900" dirty="0" smtClean="0"/>
-              <a:t>Función cuadrática</a:t>
+              <a:rPr lang="es-ES" sz="900" dirty="0"/>
+              <a:t>f</a:t>
+            </a:r>
+            <a:r>
+              <a:rPr lang="es-ES" sz="900" dirty="0" smtClean="0"/>
+              <a:t>unción </a:t>
+            </a:r>
+            <a:r>
+              <a:rPr lang="es-ES" sz="900" dirty="0" smtClean="0"/>
+              <a:t>cuadrática</a:t>
             </a:r>
             <a:endParaRPr lang="es-ES" sz="900" dirty="0"/>
           </a:p>
@@ -2419,8 +2560,20 @@
           <a:p>
             <a:pPr algn="ctr"/>
             <a:r>
-              <a:rPr lang="es-ES" sz="900" dirty="0" smtClean="0"/>
-              <a:t>Velocidad - Tiempo</a:t>
+              <a:rPr lang="es-ES" sz="900" dirty="0"/>
+              <a:t>v</a:t>
+            </a:r>
+            <a:r>
+              <a:rPr lang="es-ES" sz="900" dirty="0" smtClean="0"/>
+              <a:t>elocidad </a:t>
+            </a:r>
+            <a:r>
+              <a:rPr lang="es-ES" sz="900" dirty="0" smtClean="0"/>
+              <a:t>- </a:t>
+            </a:r>
+            <a:r>
+              <a:rPr lang="es-ES" sz="900" dirty="0" smtClean="0"/>
+              <a:t>tiempo</a:t>
             </a:r>
             <a:endParaRPr lang="es-ES" sz="900" dirty="0"/>
           </a:p>
@@ -2455,8 +2608,16 @@
           <a:p>
             <a:pPr algn="ctr"/>
             <a:r>
-              <a:rPr lang="es-ES" sz="900" dirty="0" smtClean="0"/>
-              <a:t>Pendiente representa aceleración</a:t>
+              <a:rPr lang="es-ES" sz="900" dirty="0"/>
+              <a:t>p</a:t>
+            </a:r>
+            <a:r>
+              <a:rPr lang="es-ES" sz="900" dirty="0" smtClean="0"/>
+              <a:t>endiente </a:t>
+            </a:r>
+            <a:r>
+              <a:rPr lang="es-ES" sz="900" dirty="0" smtClean="0"/>
+              <a:t>representa aceleración</a:t>
             </a:r>
             <a:endParaRPr lang="es-ES" sz="900" dirty="0"/>
           </a:p>
@@ -2492,7 +2653,11 @@
             <a:pPr algn="ctr"/>
             <a:r>
               <a:rPr lang="es-ES" sz="900" dirty="0" smtClean="0"/>
-              <a:t>Área bajo la «curva» representa el cambio de velocidad</a:t>
+              <a:t>área </a:t>
+            </a:r>
+            <a:r>
+              <a:rPr lang="es-ES" sz="900" dirty="0" smtClean="0"/>
+              <a:t>bajo la «curva» representa el cambio de velocidad</a:t>
             </a:r>
             <a:endParaRPr lang="es-ES" sz="900" dirty="0"/>
           </a:p>
@@ -2527,8 +2692,16 @@
           <a:p>
             <a:pPr algn="ctr"/>
             <a:r>
-              <a:rPr lang="es-ES" sz="900" dirty="0" smtClean="0"/>
-              <a:t>En el vacío</a:t>
+              <a:rPr lang="es-ES" sz="900" dirty="0"/>
+              <a:t>e</a:t>
+            </a:r>
+            <a:r>
+              <a:rPr lang="es-ES" sz="900" dirty="0" smtClean="0"/>
+              <a:t>n </a:t>
+            </a:r>
+            <a:r>
+              <a:rPr lang="es-ES" sz="900" dirty="0" smtClean="0"/>
+              <a:t>el vacío</a:t>
             </a:r>
             <a:endParaRPr lang="es-ES" sz="900" dirty="0"/>
           </a:p>
@@ -2563,8 +2736,16 @@
           <a:p>
             <a:pPr algn="ctr"/>
             <a:r>
-              <a:rPr lang="es-ES" sz="900" dirty="0" smtClean="0"/>
-              <a:t>Casos debidos a la aceleración de la gravedad</a:t>
+              <a:rPr lang="es-ES" sz="900" dirty="0"/>
+              <a:t>c</a:t>
+            </a:r>
+            <a:r>
+              <a:rPr lang="es-ES" sz="900" dirty="0" smtClean="0"/>
+              <a:t>asos </a:t>
+            </a:r>
+            <a:r>
+              <a:rPr lang="es-ES" sz="900" dirty="0" smtClean="0"/>
+              <a:t>debidos a la aceleración de la gravedad</a:t>
             </a:r>
             <a:endParaRPr lang="es-ES" sz="900" dirty="0"/>
           </a:p>
@@ -2599,8 +2780,16 @@
           <a:p>
             <a:pPr algn="ctr"/>
             <a:r>
-              <a:rPr lang="es-ES" sz="900" dirty="0" smtClean="0"/>
-              <a:t>Caída libre</a:t>
+              <a:rPr lang="es-ES" sz="900" dirty="0"/>
+              <a:t>c</a:t>
+            </a:r>
+            <a:r>
+              <a:rPr lang="es-ES" sz="900" dirty="0" smtClean="0"/>
+              <a:t>aída </a:t>
+            </a:r>
+            <a:r>
+              <a:rPr lang="es-ES" sz="900" dirty="0" smtClean="0"/>
+              <a:t>libre</a:t>
             </a:r>
             <a:endParaRPr lang="es-ES" sz="900" dirty="0"/>
           </a:p>
@@ -2635,8 +2824,16 @@
           <a:p>
             <a:pPr algn="ctr"/>
             <a:r>
-              <a:rPr lang="es-ES" sz="900" dirty="0" smtClean="0"/>
-              <a:t>Lanzamiento vertical</a:t>
+              <a:rPr lang="es-ES" sz="900" dirty="0"/>
+              <a:t>l</a:t>
+            </a:r>
+            <a:r>
+              <a:rPr lang="es-ES" sz="900" dirty="0" smtClean="0"/>
+              <a:t>anzamiento </a:t>
+            </a:r>
+            <a:r>
+              <a:rPr lang="es-ES" sz="900" dirty="0" smtClean="0"/>
+              <a:t>vertical</a:t>
             </a:r>
             <a:endParaRPr lang="es-ES" sz="900" dirty="0"/>
           </a:p>
@@ -2671,8 +2868,20 @@
           <a:p>
             <a:pPr algn="ctr"/>
             <a:r>
-              <a:rPr lang="es-ES" sz="900" dirty="0" smtClean="0"/>
-              <a:t>Cuerpo que desacelera mientras sube</a:t>
+              <a:rPr lang="es-ES" sz="900" dirty="0"/>
+              <a:t>u</a:t>
+            </a:r>
+            <a:r>
+              <a:rPr lang="es-ES" sz="900" dirty="0" smtClean="0"/>
+              <a:t>n c</a:t>
+            </a:r>
+            <a:r>
+              <a:rPr lang="es-ES" sz="900" dirty="0" smtClean="0"/>
+              <a:t>uerpo </a:t>
+            </a:r>
+            <a:r>
+              <a:rPr lang="es-ES" sz="900" dirty="0" smtClean="0"/>
+              <a:t>que desacelera mientras sube</a:t>
             </a:r>
             <a:endParaRPr lang="es-ES" sz="900" dirty="0"/>
           </a:p>
@@ -2687,7 +2896,7 @@
         <p:spPr>
           <a:xfrm>
             <a:off x="4042413" y="6417731"/>
-            <a:ext cx="949123" cy="369332"/>
+            <a:ext cx="949123" cy="507831"/>
           </a:xfrm>
           <a:prstGeom prst="rect">
             <a:avLst/>
@@ -2708,7 +2917,15 @@
             <a:pPr algn="ctr"/>
             <a:r>
               <a:rPr lang="es-ES" sz="900" dirty="0" smtClean="0"/>
-              <a:t>Cuerpo acelera mientras cae</a:t>
+              <a:t>un c</a:t>
+            </a:r>
+            <a:r>
+              <a:rPr lang="es-ES" sz="900" dirty="0" smtClean="0"/>
+              <a:t>uerpo </a:t>
+            </a:r>
+            <a:r>
+              <a:rPr lang="es-ES" sz="900" dirty="0" smtClean="0"/>
+              <a:t>acelera mientras cae</a:t>
             </a:r>
             <a:endParaRPr lang="es-ES" sz="900" dirty="0"/>
           </a:p>
@@ -4271,7 +4488,7 @@
         <p:spPr>
           <a:xfrm>
             <a:off x="2678950" y="6054626"/>
-            <a:ext cx="798127" cy="230832"/>
+            <a:ext cx="798127" cy="215444"/>
           </a:xfrm>
           <a:prstGeom prst="rect">
             <a:avLst/>
@@ -4288,13 +4505,13 @@
           <a:p>
             <a:pPr algn="ctr"/>
             <a:r>
-              <a:rPr lang="es-ES" sz="900" dirty="0" smtClean="0">
+              <a:rPr lang="es-ES" sz="800" dirty="0" smtClean="0">
                 <a:latin typeface="Arial" pitchFamily="34" charset="0"/>
                 <a:cs typeface="Arial" pitchFamily="34" charset="0"/>
               </a:rPr>
               <a:t>se observa</a:t>
             </a:r>
-            <a:endParaRPr lang="es-ES" sz="900" dirty="0">
+            <a:endParaRPr lang="es-ES" sz="800" dirty="0">
               <a:latin typeface="Arial" pitchFamily="34" charset="0"/>
               <a:cs typeface="Arial" pitchFamily="34" charset="0"/>
             </a:endParaRPr>
@@ -4310,7 +4527,7 @@
         <p:spPr>
           <a:xfrm>
             <a:off x="4098656" y="6083991"/>
-            <a:ext cx="798127" cy="230832"/>
+            <a:ext cx="798127" cy="215444"/>
           </a:xfrm>
           <a:prstGeom prst="rect">
             <a:avLst/>
@@ -4327,13 +4544,13 @@
           <a:p>
             <a:pPr algn="ctr"/>
             <a:r>
-              <a:rPr lang="es-ES" sz="900" dirty="0" smtClean="0">
+              <a:rPr lang="es-ES" sz="800" dirty="0" smtClean="0">
                 <a:latin typeface="Arial" pitchFamily="34" charset="0"/>
                 <a:cs typeface="Arial" pitchFamily="34" charset="0"/>
               </a:rPr>
               <a:t>se observa</a:t>
             </a:r>
-            <a:endParaRPr lang="es-ES" sz="900" dirty="0">
+            <a:endParaRPr lang="es-ES" sz="800" dirty="0">
               <a:latin typeface="Arial" pitchFamily="34" charset="0"/>
               <a:cs typeface="Arial" pitchFamily="34" charset="0"/>
             </a:endParaRPr>
@@ -4409,7 +4626,7 @@
                 <a:latin typeface="Arial" pitchFamily="34" charset="0"/>
                 <a:cs typeface="Arial" pitchFamily="34" charset="0"/>
               </a:rPr>
-              <a:t>conformadas por</a:t>
+              <a:t>como</a:t>
             </a:r>
             <a:endParaRPr lang="es-ES" sz="900" dirty="0">
               <a:latin typeface="Arial" pitchFamily="34" charset="0"/>
@@ -4426,7 +4643,7 @@
         </p:nvSpPr>
         <p:spPr>
           <a:xfrm>
-            <a:off x="3204393" y="2512849"/>
+            <a:off x="3213918" y="2512849"/>
             <a:ext cx="1083472" cy="230832"/>
           </a:xfrm>
           <a:prstGeom prst="rect">
@@ -4443,19 +4660,12 @@
           <a:lstStyle/>
           <a:p>
             <a:pPr algn="ctr"/>
-            <a:r>
-              <a:rPr lang="es-ES" sz="900" dirty="0">
-                <a:latin typeface="Arial" pitchFamily="34" charset="0"/>
-                <a:cs typeface="Arial" pitchFamily="34" charset="0"/>
-              </a:rPr>
-              <a:t>c</a:t>
-            </a:r>
             <a:r>
               <a:rPr lang="es-ES" sz="900" dirty="0" smtClean="0">
                 <a:latin typeface="Arial" pitchFamily="34" charset="0"/>
                 <a:cs typeface="Arial" pitchFamily="34" charset="0"/>
               </a:rPr>
-              <a:t>onformadas por</a:t>
+              <a:t>como</a:t>
             </a:r>
             <a:endParaRPr lang="es-ES" sz="900" dirty="0">
               <a:latin typeface="Arial" pitchFamily="34" charset="0"/>
@@ -4746,7 +4956,7 @@
         <p:spPr>
           <a:xfrm>
             <a:off x="5834987" y="6096138"/>
-            <a:ext cx="451348" cy="230832"/>
+            <a:ext cx="451348" cy="215444"/>
           </a:xfrm>
           <a:prstGeom prst="rect">
             <a:avLst/>
@@ -4763,13 +4973,13 @@
           <a:p>
             <a:pPr algn="ctr"/>
             <a:r>
-              <a:rPr lang="es-ES" sz="900" dirty="0" smtClean="0">
+              <a:rPr lang="es-ES" sz="800" dirty="0" smtClean="0">
                 <a:latin typeface="Arial" pitchFamily="34" charset="0"/>
                 <a:cs typeface="Arial" pitchFamily="34" charset="0"/>
               </a:rPr>
               <a:t>cuya</a:t>
             </a:r>
-            <a:endParaRPr lang="es-ES" sz="900" dirty="0">
+            <a:endParaRPr lang="es-ES" sz="800" dirty="0">
               <a:latin typeface="Arial" pitchFamily="34" charset="0"/>
               <a:cs typeface="Arial" pitchFamily="34" charset="0"/>
             </a:endParaRPr>
@@ -4824,7 +5034,7 @@
         <p:spPr>
           <a:xfrm>
             <a:off x="3186947" y="4566346"/>
-            <a:ext cx="1083472" cy="230832"/>
+            <a:ext cx="1083472" cy="215444"/>
           </a:xfrm>
           <a:prstGeom prst="rect">
             <a:avLst/>
@@ -4841,13 +5051,13 @@
           <a:p>
             <a:pPr algn="ctr"/>
             <a:r>
-              <a:rPr lang="es-ES" sz="900" dirty="0" smtClean="0">
+              <a:rPr lang="es-ES" sz="800" dirty="0" smtClean="0">
                 <a:latin typeface="Arial" pitchFamily="34" charset="0"/>
                 <a:cs typeface="Arial" pitchFamily="34" charset="0"/>
               </a:rPr>
               <a:t>se presentan</a:t>
             </a:r>
-            <a:endParaRPr lang="es-ES" sz="900" dirty="0">
+            <a:endParaRPr lang="es-ES" sz="800" dirty="0">
               <a:latin typeface="Arial" pitchFamily="34" charset="0"/>
               <a:cs typeface="Arial" pitchFamily="34" charset="0"/>
             </a:endParaRPr>
@@ -4863,7 +5073,7 @@
         <p:spPr>
           <a:xfrm>
             <a:off x="8211408" y="5775206"/>
-            <a:ext cx="451348" cy="230832"/>
+            <a:ext cx="451348" cy="215444"/>
           </a:xfrm>
           <a:prstGeom prst="rect">
             <a:avLst/>
@@ -4880,13 +5090,13 @@
           <a:p>
             <a:pPr algn="ctr"/>
             <a:r>
-              <a:rPr lang="es-ES" sz="900" dirty="0" smtClean="0">
+              <a:rPr lang="es-ES" sz="800" dirty="0" smtClean="0">
                 <a:latin typeface="Arial" pitchFamily="34" charset="0"/>
                 <a:cs typeface="Arial" pitchFamily="34" charset="0"/>
               </a:rPr>
               <a:t>cuya</a:t>
             </a:r>
-            <a:endParaRPr lang="es-ES" sz="900" dirty="0">
+            <a:endParaRPr lang="es-ES" sz="800" dirty="0">
               <a:latin typeface="Arial" pitchFamily="34" charset="0"/>
               <a:cs typeface="Arial" pitchFamily="34" charset="0"/>
             </a:endParaRPr>
@@ -4902,7 +5112,7 @@
         <p:spPr>
           <a:xfrm>
             <a:off x="5818629" y="4558906"/>
-            <a:ext cx="451348" cy="230832"/>
+            <a:ext cx="451348" cy="215444"/>
           </a:xfrm>
           <a:prstGeom prst="rect">
             <a:avLst/>
@@ -4919,13 +5129,13 @@
           <a:p>
             <a:pPr algn="ctr"/>
             <a:r>
-              <a:rPr lang="es-ES" sz="900" dirty="0" smtClean="0">
+              <a:rPr lang="es-ES" sz="800" dirty="0" smtClean="0">
                 <a:latin typeface="Arial" pitchFamily="34" charset="0"/>
                 <a:cs typeface="Arial" pitchFamily="34" charset="0"/>
               </a:rPr>
               <a:t>con</a:t>
             </a:r>
-            <a:endParaRPr lang="es-ES" sz="900" dirty="0">
+            <a:endParaRPr lang="es-ES" sz="800" dirty="0">
               <a:latin typeface="Arial" pitchFamily="34" charset="0"/>
               <a:cs typeface="Arial" pitchFamily="34" charset="0"/>
             </a:endParaRPr>
@@ -4941,7 +5151,7 @@
         <p:spPr>
           <a:xfrm>
             <a:off x="8211408" y="4970612"/>
-            <a:ext cx="451348" cy="230832"/>
+            <a:ext cx="451348" cy="215444"/>
           </a:xfrm>
           <a:prstGeom prst="rect">
             <a:avLst/>
@@ -4958,13 +5168,13 @@
           <a:p>
             <a:pPr algn="ctr"/>
             <a:r>
-              <a:rPr lang="es-ES" sz="900" dirty="0" smtClean="0">
+              <a:rPr lang="es-ES" sz="800" dirty="0" smtClean="0">
                 <a:latin typeface="Arial" pitchFamily="34" charset="0"/>
                 <a:cs typeface="Arial" pitchFamily="34" charset="0"/>
               </a:rPr>
               <a:t>con</a:t>
             </a:r>
-            <a:endParaRPr lang="es-ES" sz="900" dirty="0">
+            <a:endParaRPr lang="es-ES" sz="800" dirty="0">
               <a:latin typeface="Arial" pitchFamily="34" charset="0"/>
               <a:cs typeface="Arial" pitchFamily="34" charset="0"/>
             </a:endParaRPr>
@@ -4980,7 +5190,7 @@
         <p:spPr>
           <a:xfrm>
             <a:off x="679342" y="1183389"/>
-            <a:ext cx="677037" cy="230832"/>
+            <a:ext cx="677037" cy="369332"/>
           </a:xfrm>
           <a:prstGeom prst="rect">
             <a:avLst/>
@@ -4996,6 +5206,20 @@
           <a:lstStyle/>
           <a:p>
             <a:pPr algn="ctr"/>
+            <a:r>
+              <a:rPr lang="es-ES" sz="900">
+                <a:latin typeface="Arial" pitchFamily="34" charset="0"/>
+                <a:cs typeface="Arial" pitchFamily="34" charset="0"/>
+              </a:rPr>
+              <a:t>q</a:t>
+            </a:r>
+            <a:r>
+              <a:rPr lang="es-ES" sz="900" smtClean="0">
+                <a:latin typeface="Arial" pitchFamily="34" charset="0"/>
+                <a:cs typeface="Arial" pitchFamily="34" charset="0"/>
+              </a:rPr>
+              <a:t>ue </a:t>
+            </a:r>
             <a:r>
               <a:rPr lang="es-ES" sz="900" dirty="0" smtClean="0">
                 <a:latin typeface="Arial" pitchFamily="34" charset="0"/>
@@ -5113,7 +5337,7 @@
   <p:timing>
     <p:tnLst>
       <p:par>
-        <p:cTn xmlns:p14="http://schemas.microsoft.com/office/powerpoint/2010/main" id="1" dur="indefinite" restart="never" nodeType="tmRoot"/>
+        <p:cTn id="1" dur="indefinite" restart="never" nodeType="tmRoot"/>
       </p:par>
     </p:tnLst>
   </p:timing>
@@ -5375,7 +5599,7 @@
   <a:extraClrSchemeLst/>
   <a:extLst>
     <a:ext uri="{05A4C25C-085E-4340-85A3-A5531E510DB2}">
-      <thm15:themeFamily xmlns:thm15="http://schemas.microsoft.com/office/thememl/2012/main" xmlns="" name="Office Theme" id="{62F939B6-93AF-4DB8-9C6B-D6C7DFDC589F}" vid="{4A3C46E8-61CC-4603-A589-7422A47A8E4A}"/>
+      <thm15:themeFamily xmlns:thm15="http://schemas.microsoft.com/office/thememl/2012/main" name="Office Theme" id="{62F939B6-93AF-4DB8-9C6B-D6C7DFDC589F}" vid="{4A3C46E8-61CC-4603-A589-7422A47A8E4A}"/>
     </a:ext>
   </a:extLst>
 </a:theme>

</xml_diff>